<commit_message>
ajouter de courbe sur les tests de scan de phase
</commit_message>
<xml_diff>
--- a/presentations/WEST_IC_week38.pptx
+++ b/presentations/WEST_IC_week38.pptx
@@ -30,9 +30,9 @@
     <p:sldId id="303" r:id="rId21"/>
     <p:sldId id="307" r:id="rId22"/>
     <p:sldId id="301" r:id="rId23"/>
-    <p:sldId id="304" r:id="rId24"/>
-    <p:sldId id="299" r:id="rId25"/>
-    <p:sldId id="306" r:id="rId26"/>
+    <p:sldId id="299" r:id="rId24"/>
+    <p:sldId id="306" r:id="rId25"/>
+    <p:sldId id="309" r:id="rId26"/>
   </p:sldIdLst>
   <p:sldSz cx="9144000" cy="6858000" type="screen4x3"/>
   <p:notesSz cx="7099300" cy="10234613"/>
@@ -306,7 +306,7 @@
           <a:p>
             <a:fld id="{F481E118-1CEA-43E8-BD51-A8A2CBD62889}" type="datetimeFigureOut">
               <a:rPr lang="fr-FR" smtClean="0"/>
-              <a:t>22/09/2019</a:t>
+              <a:t>09/10/2019</a:t>
             </a:fld>
             <a:endParaRPr lang="fr-FR"/>
           </a:p>
@@ -471,7 +471,7 @@
           <a:p>
             <a:fld id="{F0389419-4E28-4B58-9AA2-383238311FDA}" type="datetimeFigureOut">
               <a:rPr lang="fr-FR" smtClean="0"/>
-              <a:t>22/09/2019</a:t>
+              <a:t>09/10/2019</a:t>
             </a:fld>
             <a:endParaRPr lang="fr-FR"/>
           </a:p>
@@ -1060,7 +1060,7 @@
             <a:pPr lvl="0"/>
             <a:fld id="{ED1C4103-FF01-4613-BB77-A54429AC18D2}" type="datetime4">
               <a:rPr lang="fr-FR" noProof="0" smtClean="0"/>
-              <a:t>22 septembre 2019</a:t>
+              <a:t>9 octobre 2019</a:t>
             </a:fld>
             <a:endParaRPr lang="fr-FR" noProof="0" dirty="0"/>
           </a:p>
@@ -3311,7 +3311,7 @@
             <a:pPr lvl="0"/>
             <a:fld id="{B5559CBA-976B-4265-9B41-694881203DBF}" type="datetime4">
               <a:rPr lang="fr-FR" noProof="0" smtClean="0"/>
-              <a:t>22 septembre 2019</a:t>
+              <a:t>9 octobre 2019</a:t>
             </a:fld>
             <a:endParaRPr lang="fr-FR" noProof="0" dirty="0"/>
           </a:p>
@@ -4851,7 +4851,7 @@
             <a:pPr lvl="0"/>
             <a:fld id="{B5559CBA-976B-4265-9B41-694881203DBF}" type="datetime4">
               <a:rPr lang="fr-FR" noProof="0" smtClean="0"/>
-              <a:t>22 septembre 2019</a:t>
+              <a:t>9 octobre 2019</a:t>
             </a:fld>
             <a:endParaRPr lang="fr-FR" noProof="0" dirty="0"/>
           </a:p>
@@ -5588,7 +5588,7 @@
             <a:pPr lvl="0"/>
             <a:fld id="{B5559CBA-976B-4265-9B41-694881203DBF}" type="datetime4">
               <a:rPr lang="fr-FR" noProof="0" smtClean="0"/>
-              <a:t>22 septembre 2019</a:t>
+              <a:t>9 octobre 2019</a:t>
             </a:fld>
             <a:endParaRPr lang="fr-FR" noProof="0" dirty="0"/>
           </a:p>
@@ -8930,7 +8930,7 @@
                   </a:schemeClr>
                 </a:solidFill>
               </a:rPr>
-              <a:t>22 septembre 2019</a:t>
+              <a:t>9 octobre 2019</a:t>
             </a:fld>
             <a:endParaRPr lang="fr-FR" sz="1100" dirty="0">
               <a:solidFill>
@@ -9964,7 +9964,7 @@
                   </a:schemeClr>
                 </a:solidFill>
               </a:rPr>
-              <a:t>22 septembre 2019</a:t>
+              <a:t>9 octobre 2019</a:t>
             </a:fld>
             <a:endParaRPr lang="fr-FR" sz="1100" dirty="0">
               <a:solidFill>
@@ -10991,7 +10991,7 @@
                   </a:schemeClr>
                 </a:solidFill>
               </a:rPr>
-              <a:t>22 septembre 2019</a:t>
+              <a:t>9 octobre 2019</a:t>
             </a:fld>
             <a:endParaRPr lang="fr-FR" sz="1100" dirty="0">
               <a:solidFill>
@@ -11601,21 +11601,13 @@
           <a:p>
             <a:r>
               <a:rPr lang="fr-FR" dirty="0" smtClean="0"/>
-              <a:t>Contrôle </a:t>
-            </a:r>
+              <a:t>Contrôle de la phase directement lié à la production d’impuretés</a:t>
+            </a:r>
+          </a:p>
+          <a:p>
             <a:r>
               <a:rPr lang="fr-FR" dirty="0" smtClean="0"/>
-              <a:t>de la phase directement lié à la production d’impuretés</a:t>
-            </a:r>
-          </a:p>
-          <a:p>
-            <a:r>
-              <a:rPr lang="fr-FR" dirty="0" smtClean="0"/>
-              <a:t>Beaux </a:t>
-            </a:r>
-            <a:r>
-              <a:rPr lang="fr-FR" dirty="0" smtClean="0"/>
-              <a:t>chocs combinés IC+LH. Mais production de cuivre -&gt; disruption </a:t>
+              <a:t>Beaux chocs combinés IC+LH. Mais production de cuivre -&gt; disruption </a:t>
             </a:r>
           </a:p>
         </p:txBody>
@@ -18668,12 +18660,12 @@
           <a:graphicData uri="http://schemas.openxmlformats.org/presentationml/2006/ole">
             <mc:AlternateContent xmlns:mc="http://schemas.openxmlformats.org/markup-compatibility/2006">
               <mc:Choice xmlns:v="urn:schemas-microsoft-com:vml" Requires="v">
-                <p:oleObj spid="_x0000_s1037" name="Feuille de calcul" r:id="rId4" imgW="3573751" imgH="1104840" progId="Excel.Sheet.12">
+                <p:oleObj spid="_x0000_s1039" name="Feuille de calcul" r:id="rId5" imgW="3573751" imgH="1104840" progId="Excel.Sheet.12">
                   <p:embed/>
                 </p:oleObj>
               </mc:Choice>
               <mc:Fallback>
-                <p:oleObj name="Feuille de calcul" r:id="rId4" imgW="3573751" imgH="1104840" progId="Excel.Sheet.12">
+                <p:oleObj name="Feuille de calcul" r:id="rId5" imgW="3573751" imgH="1104840" progId="Excel.Sheet.12">
                   <p:embed/>
                   <p:pic>
                     <p:nvPicPr>
@@ -18682,7 +18674,7 @@
                       <p:nvPr/>
                     </p:nvPicPr>
                     <p:blipFill>
-                      <a:blip r:embed="rId5"/>
+                      <a:blip r:embed="rId6"/>
                       <a:stretch>
                         <a:fillRect/>
                       </a:stretch>
@@ -22322,12 +22314,12 @@
           <a:graphicData uri="http://schemas.openxmlformats.org/presentationml/2006/ole">
             <mc:AlternateContent xmlns:mc="http://schemas.openxmlformats.org/markup-compatibility/2006">
               <mc:Choice xmlns:v="urn:schemas-microsoft-com:vml" Requires="v">
-                <p:oleObj spid="_x0000_s2058" name="Feuille de calcul" r:id="rId4" imgW="3573751" imgH="1470744" progId="Excel.Sheet.12">
+                <p:oleObj spid="_x0000_s2060" name="Feuille de calcul" r:id="rId5" imgW="3573751" imgH="1470744" progId="Excel.Sheet.12">
                   <p:embed/>
                 </p:oleObj>
               </mc:Choice>
               <mc:Fallback>
-                <p:oleObj name="Feuille de calcul" r:id="rId4" imgW="3573751" imgH="1470744" progId="Excel.Sheet.12">
+                <p:oleObj name="Feuille de calcul" r:id="rId5" imgW="3573751" imgH="1470744" progId="Excel.Sheet.12">
                   <p:embed/>
                   <p:pic>
                     <p:nvPicPr>
@@ -22336,7 +22328,7 @@
                       <p:nvPr/>
                     </p:nvPicPr>
                     <p:blipFill>
-                      <a:blip r:embed="rId5"/>
+                      <a:blip r:embed="rId6"/>
                       <a:stretch>
                         <a:fillRect/>
                       </a:stretch>
@@ -23679,7 +23671,11 @@
           <a:bodyPr/>
           <a:lstStyle/>
           <a:p>
-            <a:endParaRPr lang="en-GB"/>
+            <a:r>
+              <a:rPr lang="fr-FR" dirty="0" smtClean="0"/>
+              <a:t>Vendredi 20/09/2019</a:t>
+            </a:r>
+            <a:endParaRPr lang="en-GB" dirty="0"/>
           </a:p>
         </p:txBody>
       </p:sp>
@@ -23710,117 +23706,6 @@
               </a:rPr>
               <a:pPr algn="ctr"/>
               <a:t>18</a:t>
-            </a:fld>
-            <a:endParaRPr lang="fr-FR" sz="1000" noProof="0" dirty="0">
-              <a:solidFill>
-                <a:schemeClr val="bg1"/>
-              </a:solidFill>
-              <a:latin typeface="Arial" charset="0"/>
-              <a:ea typeface="Arial" charset="0"/>
-              <a:cs typeface="Arial" charset="0"/>
-            </a:endParaRPr>
-          </a:p>
-        </p:txBody>
-      </p:sp>
-      <p:sp>
-        <p:nvSpPr>
-          <p:cNvPr id="4" name="Espace réservé du texte 3"/>
-          <p:cNvSpPr>
-            <a:spLocks noGrp="1"/>
-          </p:cNvSpPr>
-          <p:nvPr>
-            <p:ph type="body" sz="quarter" idx="12"/>
-          </p:nvPr>
-        </p:nvSpPr>
-        <p:spPr/>
-        <p:txBody>
-          <a:bodyPr/>
-          <a:lstStyle/>
-          <a:p>
-            <a:endParaRPr lang="en-GB"/>
-          </a:p>
-        </p:txBody>
-      </p:sp>
-    </p:spTree>
-    <p:extLst>
-      <p:ext uri="{BB962C8B-B14F-4D97-AF65-F5344CB8AC3E}">
-        <p14:creationId xmlns:p14="http://schemas.microsoft.com/office/powerpoint/2010/main" val="3361009075"/>
-      </p:ext>
-    </p:extLst>
-  </p:cSld>
-  <p:clrMapOvr>
-    <a:masterClrMapping/>
-  </p:clrMapOvr>
-</p:sld>
-</file>
-
-<file path=ppt/slides/slide19.xml><?xml version="1.0" encoding="utf-8"?>
-<p:sld xmlns:a="http://schemas.openxmlformats.org/drawingml/2006/main" xmlns:r="http://schemas.openxmlformats.org/officeDocument/2006/relationships" xmlns:p="http://schemas.openxmlformats.org/presentationml/2006/main">
-  <p:cSld>
-    <p:spTree>
-      <p:nvGrpSpPr>
-        <p:cNvPr id="1" name=""/>
-        <p:cNvGrpSpPr/>
-        <p:nvPr/>
-      </p:nvGrpSpPr>
-      <p:grpSpPr>
-        <a:xfrm>
-          <a:off x="0" y="0"/>
-          <a:ext cx="0" cy="0"/>
-          <a:chOff x="0" y="0"/>
-          <a:chExt cx="0" cy="0"/>
-        </a:xfrm>
-      </p:grpSpPr>
-      <p:sp>
-        <p:nvSpPr>
-          <p:cNvPr id="2" name="Titre 1"/>
-          <p:cNvSpPr>
-            <a:spLocks noGrp="1"/>
-          </p:cNvSpPr>
-          <p:nvPr>
-            <p:ph type="title"/>
-          </p:nvPr>
-        </p:nvSpPr>
-        <p:spPr/>
-        <p:txBody>
-          <a:bodyPr/>
-          <a:lstStyle/>
-          <a:p>
-            <a:r>
-              <a:rPr lang="fr-FR" dirty="0" smtClean="0"/>
-              <a:t>Vendredi 20/09/2019</a:t>
-            </a:r>
-            <a:endParaRPr lang="en-GB" dirty="0"/>
-          </a:p>
-        </p:txBody>
-      </p:sp>
-      <p:sp>
-        <p:nvSpPr>
-          <p:cNvPr id="3" name="Espace réservé du numéro de diapositive 2"/>
-          <p:cNvSpPr>
-            <a:spLocks noGrp="1"/>
-          </p:cNvSpPr>
-          <p:nvPr>
-            <p:ph type="sldNum" sz="quarter" idx="10"/>
-          </p:nvPr>
-        </p:nvSpPr>
-        <p:spPr/>
-        <p:txBody>
-          <a:bodyPr/>
-          <a:lstStyle/>
-          <a:p>
-            <a:pPr algn="ctr"/>
-            <a:fld id="{854A34C9-9A4B-6445-85E1-F779B5E87362}" type="slidenum">
-              <a:rPr lang="fr-FR" sz="1000" noProof="0" smtClean="0">
-                <a:solidFill>
-                  <a:schemeClr val="bg1"/>
-                </a:solidFill>
-                <a:latin typeface="Arial" charset="0"/>
-                <a:ea typeface="Arial" charset="0"/>
-                <a:cs typeface="Arial" charset="0"/>
-              </a:rPr>
-              <a:pPr algn="ctr"/>
-              <a:t>19</a:t>
             </a:fld>
             <a:endParaRPr lang="fr-FR" sz="1000" noProof="0" dirty="0">
               <a:solidFill>
@@ -24365,7 +24250,7 @@
             <a:pPr algn="ctr"/>
             <a:r>
               <a:rPr lang="fr-FR" dirty="0" smtClean="0"/>
-              <a:t>Q2</a:t>
+              <a:t>Q2, Q4</a:t>
             </a:r>
             <a:endParaRPr lang="en-GB" dirty="0"/>
           </a:p>
@@ -24590,8 +24475,8 @@
         </p:nvSpPr>
         <p:spPr>
           <a:xfrm>
-            <a:off x="2365248" y="2848647"/>
-            <a:ext cx="3432048" cy="676656"/>
+            <a:off x="2365248" y="2854743"/>
+            <a:ext cx="3432048" cy="670560"/>
           </a:xfrm>
           <a:custGeom>
             <a:avLst/>
@@ -24630,6 +24515,42 @@
               <a:gd name="connsiteY2" fmla="*/ 676656 h 676656"/>
               <a:gd name="connsiteX3" fmla="*/ 1615440 w 1615440"/>
               <a:gd name="connsiteY3" fmla="*/ 676656 h 676656"/>
+              <a:gd name="connsiteX0" fmla="*/ 0 w 1615440"/>
+              <a:gd name="connsiteY0" fmla="*/ 22643 h 693203"/>
+              <a:gd name="connsiteX1" fmla="*/ 232655 w 1615440"/>
+              <a:gd name="connsiteY1" fmla="*/ 16547 h 693203"/>
+              <a:gd name="connsiteX2" fmla="*/ 440922 w 1615440"/>
+              <a:gd name="connsiteY2" fmla="*/ 0 h 693203"/>
+              <a:gd name="connsiteX3" fmla="*/ 1420325 w 1615440"/>
+              <a:gd name="connsiteY3" fmla="*/ 693203 h 693203"/>
+              <a:gd name="connsiteX4" fmla="*/ 1615440 w 1615440"/>
+              <a:gd name="connsiteY4" fmla="*/ 693203 h 693203"/>
+              <a:gd name="connsiteX0" fmla="*/ 0 w 1615440"/>
+              <a:gd name="connsiteY0" fmla="*/ 6728 h 677288"/>
+              <a:gd name="connsiteX1" fmla="*/ 232655 w 1615440"/>
+              <a:gd name="connsiteY1" fmla="*/ 632 h 677288"/>
+              <a:gd name="connsiteX2" fmla="*/ 452877 w 1615440"/>
+              <a:gd name="connsiteY2" fmla="*/ 22185 h 677288"/>
+              <a:gd name="connsiteX3" fmla="*/ 1420325 w 1615440"/>
+              <a:gd name="connsiteY3" fmla="*/ 677288 h 677288"/>
+              <a:gd name="connsiteX4" fmla="*/ 1615440 w 1615440"/>
+              <a:gd name="connsiteY4" fmla="*/ 677288 h 677288"/>
+              <a:gd name="connsiteX0" fmla="*/ 0 w 1615440"/>
+              <a:gd name="connsiteY0" fmla="*/ 0 h 670560"/>
+              <a:gd name="connsiteX1" fmla="*/ 452877 w 1615440"/>
+              <a:gd name="connsiteY1" fmla="*/ 15457 h 670560"/>
+              <a:gd name="connsiteX2" fmla="*/ 1420325 w 1615440"/>
+              <a:gd name="connsiteY2" fmla="*/ 670560 h 670560"/>
+              <a:gd name="connsiteX3" fmla="*/ 1615440 w 1615440"/>
+              <a:gd name="connsiteY3" fmla="*/ 670560 h 670560"/>
+              <a:gd name="connsiteX0" fmla="*/ 0 w 1615440"/>
+              <a:gd name="connsiteY0" fmla="*/ 0 h 670560"/>
+              <a:gd name="connsiteX1" fmla="*/ 428966 w 1615440"/>
+              <a:gd name="connsiteY1" fmla="*/ 2757 h 670560"/>
+              <a:gd name="connsiteX2" fmla="*/ 1420325 w 1615440"/>
+              <a:gd name="connsiteY2" fmla="*/ 670560 h 670560"/>
+              <a:gd name="connsiteX3" fmla="*/ 1615440 w 1615440"/>
+              <a:gd name="connsiteY3" fmla="*/ 670560 h 670560"/>
             </a:gdLst>
             <a:ahLst/>
             <a:cxnLst>
@@ -24648,18 +24569,18 @@
             </a:cxnLst>
             <a:rect l="l" t="t" r="r" b="b"/>
             <a:pathLst>
-              <a:path w="1615440" h="676656">
+              <a:path w="1615440" h="670560">
                 <a:moveTo>
-                  <a:pt x="0" y="6096"/>
+                  <a:pt x="0" y="0"/>
                 </a:moveTo>
                 <a:lnTo>
-                  <a:pt x="232655" y="0"/>
+                  <a:pt x="428966" y="2757"/>
                 </a:lnTo>
                 <a:lnTo>
-                  <a:pt x="1420325" y="676656"/>
+                  <a:pt x="1420325" y="670560"/>
                 </a:lnTo>
                 <a:lnTo>
-                  <a:pt x="1615440" y="676656"/>
+                  <a:pt x="1615440" y="670560"/>
                 </a:lnTo>
               </a:path>
             </a:pathLst>
@@ -24694,7 +24615,7 @@
           <a:lstStyle/>
           <a:p>
             <a:pPr algn="ctr"/>
-            <a:endParaRPr lang="en-GB"/>
+            <a:endParaRPr lang="en-GB" dirty="0"/>
           </a:p>
         </p:txBody>
       </p:sp>
@@ -24799,6 +24720,199 @@
     <p:extLst>
       <p:ext uri="{BB962C8B-B14F-4D97-AF65-F5344CB8AC3E}">
         <p14:creationId xmlns:p14="http://schemas.microsoft.com/office/powerpoint/2010/main" val="585485274"/>
+      </p:ext>
+    </p:extLst>
+  </p:cSld>
+  <p:clrMapOvr>
+    <a:masterClrMapping/>
+  </p:clrMapOvr>
+</p:sld>
+</file>
+
+<file path=ppt/slides/slide19.xml><?xml version="1.0" encoding="utf-8"?>
+<p:sld xmlns:a="http://schemas.openxmlformats.org/drawingml/2006/main" xmlns:r="http://schemas.openxmlformats.org/officeDocument/2006/relationships" xmlns:p="http://schemas.openxmlformats.org/presentationml/2006/main">
+  <p:cSld>
+    <p:spTree>
+      <p:nvGrpSpPr>
+        <p:cNvPr id="1" name=""/>
+        <p:cNvGrpSpPr/>
+        <p:nvPr/>
+      </p:nvGrpSpPr>
+      <p:grpSpPr>
+        <a:xfrm>
+          <a:off x="0" y="0"/>
+          <a:ext cx="0" cy="0"/>
+          <a:chOff x="0" y="0"/>
+          <a:chExt cx="0" cy="0"/>
+        </a:xfrm>
+      </p:grpSpPr>
+      <p:sp>
+        <p:nvSpPr>
+          <p:cNvPr id="2" name="Titre 1"/>
+          <p:cNvSpPr>
+            <a:spLocks noGrp="1"/>
+          </p:cNvSpPr>
+          <p:nvPr>
+            <p:ph type="title"/>
+          </p:nvPr>
+        </p:nvSpPr>
+        <p:spPr/>
+        <p:txBody>
+          <a:bodyPr/>
+          <a:lstStyle/>
+          <a:p>
+            <a:r>
+              <a:rPr lang="fr-FR" dirty="0" smtClean="0"/>
+              <a:t>#55222 – Phase Scan Q4</a:t>
+            </a:r>
+            <a:endParaRPr lang="en-GB" dirty="0"/>
+          </a:p>
+        </p:txBody>
+      </p:sp>
+      <p:sp>
+        <p:nvSpPr>
+          <p:cNvPr id="3" name="Espace réservé du numéro de diapositive 2"/>
+          <p:cNvSpPr>
+            <a:spLocks noGrp="1"/>
+          </p:cNvSpPr>
+          <p:nvPr>
+            <p:ph type="sldNum" sz="quarter" idx="10"/>
+          </p:nvPr>
+        </p:nvSpPr>
+        <p:spPr/>
+        <p:txBody>
+          <a:bodyPr/>
+          <a:lstStyle/>
+          <a:p>
+            <a:pPr algn="ctr"/>
+            <a:fld id="{854A34C9-9A4B-6445-85E1-F779B5E87362}" type="slidenum">
+              <a:rPr lang="fr-FR" sz="1000" noProof="0" smtClean="0">
+                <a:solidFill>
+                  <a:schemeClr val="bg1"/>
+                </a:solidFill>
+                <a:latin typeface="Arial" charset="0"/>
+                <a:ea typeface="Arial" charset="0"/>
+                <a:cs typeface="Arial" charset="0"/>
+              </a:rPr>
+              <a:pPr algn="ctr"/>
+              <a:t>19</a:t>
+            </a:fld>
+            <a:endParaRPr lang="fr-FR" sz="1000" noProof="0" dirty="0">
+              <a:solidFill>
+                <a:schemeClr val="bg1"/>
+              </a:solidFill>
+              <a:latin typeface="Arial" charset="0"/>
+              <a:ea typeface="Arial" charset="0"/>
+              <a:cs typeface="Arial" charset="0"/>
+            </a:endParaRPr>
+          </a:p>
+        </p:txBody>
+      </p:sp>
+      <p:sp>
+        <p:nvSpPr>
+          <p:cNvPr id="4" name="Espace réservé du texte 3"/>
+          <p:cNvSpPr>
+            <a:spLocks noGrp="1"/>
+          </p:cNvSpPr>
+          <p:nvPr>
+            <p:ph type="body" sz="quarter" idx="12"/>
+          </p:nvPr>
+        </p:nvSpPr>
+        <p:spPr/>
+        <p:txBody>
+          <a:bodyPr/>
+          <a:lstStyle/>
+          <a:p>
+            <a:endParaRPr lang="en-GB"/>
+          </a:p>
+        </p:txBody>
+      </p:sp>
+      <p:pic>
+        <p:nvPicPr>
+          <p:cNvPr id="3074" name="Picture 2" descr="C:\Users\JH218595\Documents\WEST_C4\shot_figures\WEST_IC_55222_Prad_vs_phase.png"/>
+          <p:cNvPicPr>
+            <a:picLocks noChangeAspect="1" noChangeArrowheads="1"/>
+          </p:cNvPicPr>
+          <p:nvPr/>
+        </p:nvPicPr>
+        <p:blipFill>
+          <a:blip r:embed="rId2">
+            <a:extLst>
+              <a:ext uri="{28A0092B-C50C-407E-A947-70E740481C1C}">
+                <a14:useLocalDpi xmlns:a14="http://schemas.microsoft.com/office/drawing/2010/main" val="0"/>
+              </a:ext>
+            </a:extLst>
+          </a:blip>
+          <a:srcRect/>
+          <a:stretch>
+            <a:fillRect/>
+          </a:stretch>
+        </p:blipFill>
+        <p:spPr bwMode="auto">
+          <a:xfrm>
+            <a:off x="4578060" y="2374900"/>
+            <a:ext cx="4565940" cy="3395663"/>
+          </a:xfrm>
+          <a:prstGeom prst="rect">
+            <a:avLst/>
+          </a:prstGeom>
+          <a:noFill/>
+          <a:extLst>
+            <a:ext uri="{909E8E84-426E-40DD-AFC4-6F175D3DCCD1}">
+              <a14:hiddenFill xmlns:a14="http://schemas.microsoft.com/office/drawing/2010/main">
+                <a:solidFill>
+                  <a:srgbClr val="FFFFFF"/>
+                </a:solidFill>
+              </a14:hiddenFill>
+            </a:ext>
+          </a:extLst>
+        </p:spPr>
+      </p:pic>
+      <p:pic>
+        <p:nvPicPr>
+          <p:cNvPr id="3077" name="Picture 5" descr="C:\Users\JH218595\Documents\WEST_C4\shot_figures\WEST_IC_55222.png"/>
+          <p:cNvPicPr>
+            <a:picLocks noChangeAspect="1" noChangeArrowheads="1"/>
+          </p:cNvPicPr>
+          <p:nvPr/>
+        </p:nvPicPr>
+        <p:blipFill>
+          <a:blip r:embed="rId3">
+            <a:extLst>
+              <a:ext uri="{28A0092B-C50C-407E-A947-70E740481C1C}">
+                <a14:useLocalDpi xmlns:a14="http://schemas.microsoft.com/office/drawing/2010/main" val="0"/>
+              </a:ext>
+            </a:extLst>
+          </a:blip>
+          <a:srcRect/>
+          <a:stretch>
+            <a:fillRect/>
+          </a:stretch>
+        </p:blipFill>
+        <p:spPr bwMode="auto">
+          <a:xfrm>
+            <a:off x="0" y="2374900"/>
+            <a:ext cx="4565940" cy="3395663"/>
+          </a:xfrm>
+          <a:prstGeom prst="rect">
+            <a:avLst/>
+          </a:prstGeom>
+          <a:noFill/>
+          <a:extLst>
+            <a:ext uri="{909E8E84-426E-40DD-AFC4-6F175D3DCCD1}">
+              <a14:hiddenFill xmlns:a14="http://schemas.microsoft.com/office/drawing/2010/main">
+                <a:solidFill>
+                  <a:srgbClr val="FFFFFF"/>
+                </a:solidFill>
+              </a14:hiddenFill>
+            </a:ext>
+          </a:extLst>
+        </p:spPr>
+      </p:pic>
+    </p:spTree>
+    <p:extLst>
+      <p:ext uri="{BB962C8B-B14F-4D97-AF65-F5344CB8AC3E}">
+        <p14:creationId xmlns:p14="http://schemas.microsoft.com/office/powerpoint/2010/main" val="2654049938"/>
       </p:ext>
     </p:extLst>
   </p:cSld>
@@ -24956,7 +25070,11 @@
           <a:bodyPr/>
           <a:lstStyle/>
           <a:p>
-            <a:endParaRPr lang="en-GB"/>
+            <a:r>
+              <a:rPr lang="fr-FR" dirty="0" smtClean="0"/>
+              <a:t>#55226 – Phase Scan Q2</a:t>
+            </a:r>
+            <a:endParaRPr lang="en-GB" dirty="0"/>
           </a:p>
         </p:txBody>
       </p:sp>
@@ -25018,10 +25136,90 @@
           </a:p>
         </p:txBody>
       </p:sp>
+      <p:pic>
+        <p:nvPicPr>
+          <p:cNvPr id="3074" name="Picture 2"/>
+          <p:cNvPicPr>
+            <a:picLocks noChangeAspect="1" noChangeArrowheads="1"/>
+          </p:cNvPicPr>
+          <p:nvPr/>
+        </p:nvPicPr>
+        <p:blipFill>
+          <a:blip r:embed="rId2">
+            <a:extLst>
+              <a:ext uri="{28A0092B-C50C-407E-A947-70E740481C1C}">
+                <a14:useLocalDpi xmlns:a14="http://schemas.microsoft.com/office/drawing/2010/main" val="0"/>
+              </a:ext>
+            </a:extLst>
+          </a:blip>
+          <a:stretch>
+            <a:fillRect/>
+          </a:stretch>
+        </p:blipFill>
+        <p:spPr bwMode="auto">
+          <a:xfrm>
+            <a:off x="4578231" y="2374900"/>
+            <a:ext cx="4565597" cy="3395663"/>
+          </a:xfrm>
+          <a:prstGeom prst="rect">
+            <a:avLst/>
+          </a:prstGeom>
+          <a:noFill/>
+          <a:extLst>
+            <a:ext uri="{909E8E84-426E-40DD-AFC4-6F175D3DCCD1}">
+              <a14:hiddenFill xmlns:a14="http://schemas.microsoft.com/office/drawing/2010/main">
+                <a:solidFill>
+                  <a:srgbClr val="FFFFFF"/>
+                </a:solidFill>
+              </a14:hiddenFill>
+            </a:ext>
+          </a:extLst>
+        </p:spPr>
+      </p:pic>
+      <p:pic>
+        <p:nvPicPr>
+          <p:cNvPr id="3077" name="Picture 5"/>
+          <p:cNvPicPr>
+            <a:picLocks noChangeAspect="1" noChangeArrowheads="1"/>
+          </p:cNvPicPr>
+          <p:nvPr/>
+        </p:nvPicPr>
+        <p:blipFill>
+          <a:blip r:embed="rId3">
+            <a:extLst>
+              <a:ext uri="{28A0092B-C50C-407E-A947-70E740481C1C}">
+                <a14:useLocalDpi xmlns:a14="http://schemas.microsoft.com/office/drawing/2010/main" val="0"/>
+              </a:ext>
+            </a:extLst>
+          </a:blip>
+          <a:stretch>
+            <a:fillRect/>
+          </a:stretch>
+        </p:blipFill>
+        <p:spPr bwMode="auto">
+          <a:xfrm>
+            <a:off x="171" y="2374900"/>
+            <a:ext cx="4565597" cy="3395663"/>
+          </a:xfrm>
+          <a:prstGeom prst="rect">
+            <a:avLst/>
+          </a:prstGeom>
+          <a:noFill/>
+          <a:extLst>
+            <a:ext uri="{909E8E84-426E-40DD-AFC4-6F175D3DCCD1}">
+              <a14:hiddenFill xmlns:a14="http://schemas.microsoft.com/office/drawing/2010/main">
+                <a:solidFill>
+                  <a:srgbClr val="FFFFFF"/>
+                </a:solidFill>
+              </a14:hiddenFill>
+            </a:ext>
+          </a:extLst>
+        </p:spPr>
+      </p:pic>
     </p:spTree>
     <p:extLst>
       <p:ext uri="{BB962C8B-B14F-4D97-AF65-F5344CB8AC3E}">
-        <p14:creationId xmlns:p14="http://schemas.microsoft.com/office/powerpoint/2010/main" val="2654049938"/>
+        <p14:creationId xmlns:p14="http://schemas.microsoft.com/office/powerpoint/2010/main" val="2916354093"/>
       </p:ext>
     </p:extLst>
   </p:cSld>
@@ -42819,14 +43017,14 @@
 <file path=customXml/itemProps3.xml><?xml version="1.0" encoding="utf-8"?>
 <ds:datastoreItem xmlns:ds="http://schemas.openxmlformats.org/officeDocument/2006/customXml" ds:itemID="{C4B0D5B4-4CC6-4497-9BFB-91C4C64EBEC9}">
   <ds:schemaRefs>
-    <ds:schemaRef ds:uri="http://schemas.openxmlformats.org/package/2006/metadata/core-properties"/>
+    <ds:schemaRef ds:uri="http://schemas.microsoft.com/office/infopath/2007/PartnerControls"/>
+    <ds:schemaRef ds:uri="http://schemas.microsoft.com/office/2006/documentManagement/types"/>
+    <ds:schemaRef ds:uri="http://purl.org/dc/elements/1.1/"/>
     <ds:schemaRef ds:uri="http://purl.org/dc/terms/"/>
-    <ds:schemaRef ds:uri="http://purl.org/dc/elements/1.1/"/>
-    <ds:schemaRef ds:uri="http://schemas.microsoft.com/office/infopath/2007/PartnerControls"/>
-    <ds:schemaRef ds:uri="http://schemas.microsoft.com/office/2006/metadata/properties"/>
-    <ds:schemaRef ds:uri="http://schemas.microsoft.com/office/2006/documentManagement/types"/>
     <ds:schemaRef ds:uri="http://www.w3.org/XML/1998/namespace"/>
     <ds:schemaRef ds:uri="http://purl.org/dc/dcmitype/"/>
+    <ds:schemaRef ds:uri="http://schemas.openxmlformats.org/package/2006/metadata/core-properties"/>
+    <ds:schemaRef ds:uri="http://schemas.microsoft.com/office/2006/metadata/properties"/>
   </ds:schemaRefs>
 </ds:datastoreItem>
 </file>
</xml_diff>